<commit_message>
Poster first draft and paper final submission
</commit_message>
<xml_diff>
--- a/MKIImpedancePoster/beamScreen.pptx
+++ b/MKIImpedancePoster/beamScreen.pptx
@@ -7,14 +7,14 @@
   <p:sldIdLst>
     <p:sldId id="256" r:id="rId2"/>
   </p:sldIdLst>
-  <p:sldSz cx="18002250" cy="18002250"/>
+  <p:sldSz cx="14401800" cy="9001125"/>
   <p:notesSz cx="6858000" cy="9144000"/>
   <p:defaultTextStyle>
     <a:defPPr>
       <a:defRPr lang="en-US"/>
     </a:defPPr>
-    <a:lvl1pPr marL="0" algn="l" defTabSz="2057400" rtl="0" eaLnBrk="1" latinLnBrk="0" hangingPunct="1">
-      <a:defRPr sz="4100" kern="1200">
+    <a:lvl1pPr marL="0" algn="l" defTabSz="1337310" rtl="0" eaLnBrk="1" latinLnBrk="0" hangingPunct="1">
+      <a:defRPr sz="2700" kern="1200">
         <a:solidFill>
           <a:schemeClr val="tx1"/>
         </a:solidFill>
@@ -23,8 +23,8 @@
         <a:cs typeface="+mn-cs"/>
       </a:defRPr>
     </a:lvl1pPr>
-    <a:lvl2pPr marL="1028700" algn="l" defTabSz="2057400" rtl="0" eaLnBrk="1" latinLnBrk="0" hangingPunct="1">
-      <a:defRPr sz="4100" kern="1200">
+    <a:lvl2pPr marL="668655" algn="l" defTabSz="1337310" rtl="0" eaLnBrk="1" latinLnBrk="0" hangingPunct="1">
+      <a:defRPr sz="2700" kern="1200">
         <a:solidFill>
           <a:schemeClr val="tx1"/>
         </a:solidFill>
@@ -33,8 +33,8 @@
         <a:cs typeface="+mn-cs"/>
       </a:defRPr>
     </a:lvl2pPr>
-    <a:lvl3pPr marL="2057400" algn="l" defTabSz="2057400" rtl="0" eaLnBrk="1" latinLnBrk="0" hangingPunct="1">
-      <a:defRPr sz="4100" kern="1200">
+    <a:lvl3pPr marL="1337310" algn="l" defTabSz="1337310" rtl="0" eaLnBrk="1" latinLnBrk="0" hangingPunct="1">
+      <a:defRPr sz="2700" kern="1200">
         <a:solidFill>
           <a:schemeClr val="tx1"/>
         </a:solidFill>
@@ -43,8 +43,8 @@
         <a:cs typeface="+mn-cs"/>
       </a:defRPr>
     </a:lvl3pPr>
-    <a:lvl4pPr marL="3086100" algn="l" defTabSz="2057400" rtl="0" eaLnBrk="1" latinLnBrk="0" hangingPunct="1">
-      <a:defRPr sz="4100" kern="1200">
+    <a:lvl4pPr marL="2005965" algn="l" defTabSz="1337310" rtl="0" eaLnBrk="1" latinLnBrk="0" hangingPunct="1">
+      <a:defRPr sz="2700" kern="1200">
         <a:solidFill>
           <a:schemeClr val="tx1"/>
         </a:solidFill>
@@ -53,8 +53,8 @@
         <a:cs typeface="+mn-cs"/>
       </a:defRPr>
     </a:lvl4pPr>
-    <a:lvl5pPr marL="4114800" algn="l" defTabSz="2057400" rtl="0" eaLnBrk="1" latinLnBrk="0" hangingPunct="1">
-      <a:defRPr sz="4100" kern="1200">
+    <a:lvl5pPr marL="2674620" algn="l" defTabSz="1337310" rtl="0" eaLnBrk="1" latinLnBrk="0" hangingPunct="1">
+      <a:defRPr sz="2700" kern="1200">
         <a:solidFill>
           <a:schemeClr val="tx1"/>
         </a:solidFill>
@@ -63,8 +63,8 @@
         <a:cs typeface="+mn-cs"/>
       </a:defRPr>
     </a:lvl5pPr>
-    <a:lvl6pPr marL="5143500" algn="l" defTabSz="2057400" rtl="0" eaLnBrk="1" latinLnBrk="0" hangingPunct="1">
-      <a:defRPr sz="4100" kern="1200">
+    <a:lvl6pPr marL="3343275" algn="l" defTabSz="1337310" rtl="0" eaLnBrk="1" latinLnBrk="0" hangingPunct="1">
+      <a:defRPr sz="2700" kern="1200">
         <a:solidFill>
           <a:schemeClr val="tx1"/>
         </a:solidFill>
@@ -73,8 +73,8 @@
         <a:cs typeface="+mn-cs"/>
       </a:defRPr>
     </a:lvl6pPr>
-    <a:lvl7pPr marL="6172200" algn="l" defTabSz="2057400" rtl="0" eaLnBrk="1" latinLnBrk="0" hangingPunct="1">
-      <a:defRPr sz="4100" kern="1200">
+    <a:lvl7pPr marL="4011930" algn="l" defTabSz="1337310" rtl="0" eaLnBrk="1" latinLnBrk="0" hangingPunct="1">
+      <a:defRPr sz="2700" kern="1200">
         <a:solidFill>
           <a:schemeClr val="tx1"/>
         </a:solidFill>
@@ -83,8 +83,8 @@
         <a:cs typeface="+mn-cs"/>
       </a:defRPr>
     </a:lvl7pPr>
-    <a:lvl8pPr marL="7200900" algn="l" defTabSz="2057400" rtl="0" eaLnBrk="1" latinLnBrk="0" hangingPunct="1">
-      <a:defRPr sz="4100" kern="1200">
+    <a:lvl8pPr marL="4680585" algn="l" defTabSz="1337310" rtl="0" eaLnBrk="1" latinLnBrk="0" hangingPunct="1">
+      <a:defRPr sz="2700" kern="1200">
         <a:solidFill>
           <a:schemeClr val="tx1"/>
         </a:solidFill>
@@ -93,8 +93,8 @@
         <a:cs typeface="+mn-cs"/>
       </a:defRPr>
     </a:lvl8pPr>
-    <a:lvl9pPr marL="8229600" algn="l" defTabSz="2057400" rtl="0" eaLnBrk="1" latinLnBrk="0" hangingPunct="1">
-      <a:defRPr sz="4100" kern="1200">
+    <a:lvl9pPr marL="5349240" algn="l" defTabSz="1337310" rtl="0" eaLnBrk="1" latinLnBrk="0" hangingPunct="1">
+      <a:defRPr sz="2700" kern="1200">
         <a:solidFill>
           <a:schemeClr val="tx1"/>
         </a:solidFill>
@@ -136,8 +136,8 @@
         </p:nvSpPr>
         <p:spPr>
           <a:xfrm>
-            <a:off x="1350169" y="5592367"/>
-            <a:ext cx="15301913" cy="3858816"/>
+            <a:off x="1080136" y="2796184"/>
+            <a:ext cx="12241530" cy="1929408"/>
           </a:xfrm>
         </p:spPr>
         <p:txBody>
@@ -164,8 +164,8 @@
         </p:nvSpPr>
         <p:spPr>
           <a:xfrm>
-            <a:off x="2700338" y="10201275"/>
-            <a:ext cx="12601575" cy="4600575"/>
+            <a:off x="2160271" y="5100638"/>
+            <a:ext cx="10081260" cy="2300288"/>
           </a:xfrm>
         </p:spPr>
         <p:txBody>
@@ -181,7 +181,7 @@
                 </a:solidFill>
               </a:defRPr>
             </a:lvl1pPr>
-            <a:lvl2pPr marL="1028700" indent="0" algn="ctr">
+            <a:lvl2pPr marL="668655" indent="0" algn="ctr">
               <a:buNone/>
               <a:defRPr>
                 <a:solidFill>
@@ -191,7 +191,7 @@
                 </a:solidFill>
               </a:defRPr>
             </a:lvl2pPr>
-            <a:lvl3pPr marL="2057400" indent="0" algn="ctr">
+            <a:lvl3pPr marL="1337310" indent="0" algn="ctr">
               <a:buNone/>
               <a:defRPr>
                 <a:solidFill>
@@ -201,7 +201,7 @@
                 </a:solidFill>
               </a:defRPr>
             </a:lvl3pPr>
-            <a:lvl4pPr marL="3086100" indent="0" algn="ctr">
+            <a:lvl4pPr marL="2005965" indent="0" algn="ctr">
               <a:buNone/>
               <a:defRPr>
                 <a:solidFill>
@@ -211,7 +211,7 @@
                 </a:solidFill>
               </a:defRPr>
             </a:lvl4pPr>
-            <a:lvl5pPr marL="4114800" indent="0" algn="ctr">
+            <a:lvl5pPr marL="2674620" indent="0" algn="ctr">
               <a:buNone/>
               <a:defRPr>
                 <a:solidFill>
@@ -221,7 +221,7 @@
                 </a:solidFill>
               </a:defRPr>
             </a:lvl5pPr>
-            <a:lvl6pPr marL="5143500" indent="0" algn="ctr">
+            <a:lvl6pPr marL="3343275" indent="0" algn="ctr">
               <a:buNone/>
               <a:defRPr>
                 <a:solidFill>
@@ -231,7 +231,7 @@
                 </a:solidFill>
               </a:defRPr>
             </a:lvl6pPr>
-            <a:lvl7pPr marL="6172200" indent="0" algn="ctr">
+            <a:lvl7pPr marL="4011930" indent="0" algn="ctr">
               <a:buNone/>
               <a:defRPr>
                 <a:solidFill>
@@ -241,7 +241,7 @@
                 </a:solidFill>
               </a:defRPr>
             </a:lvl7pPr>
-            <a:lvl8pPr marL="7200900" indent="0" algn="ctr">
+            <a:lvl8pPr marL="4680585" indent="0" algn="ctr">
               <a:buNone/>
               <a:defRPr>
                 <a:solidFill>
@@ -251,7 +251,7 @@
                 </a:solidFill>
               </a:defRPr>
             </a:lvl8pPr>
-            <a:lvl9pPr marL="8229600" indent="0" algn="ctr">
+            <a:lvl9pPr marL="5349240" indent="0" algn="ctr">
               <a:buNone/>
               <a:defRPr>
                 <a:solidFill>
@@ -548,8 +548,8 @@
         </p:nvSpPr>
         <p:spPr>
           <a:xfrm>
-            <a:off x="25696963" y="1891903"/>
-            <a:ext cx="7972872" cy="40321706"/>
+            <a:off x="20557570" y="945952"/>
+            <a:ext cx="6378298" cy="20160853"/>
           </a:xfrm>
         </p:spPr>
         <p:txBody>
@@ -576,8 +576,8 @@
         </p:nvSpPr>
         <p:spPr>
           <a:xfrm>
-            <a:off x="1772097" y="1891903"/>
-            <a:ext cx="23624827" cy="40321706"/>
+            <a:off x="1417678" y="945952"/>
+            <a:ext cx="18899862" cy="20160853"/>
           </a:xfrm>
         </p:spPr>
         <p:txBody>
@@ -898,15 +898,15 @@
         </p:nvSpPr>
         <p:spPr>
           <a:xfrm>
-            <a:off x="1422053" y="11568114"/>
-            <a:ext cx="15301913" cy="3575447"/>
+            <a:off x="1137643" y="5784057"/>
+            <a:ext cx="12241530" cy="1787724"/>
           </a:xfrm>
         </p:spPr>
         <p:txBody>
           <a:bodyPr anchor="t"/>
           <a:lstStyle>
             <a:lvl1pPr algn="l">
-              <a:defRPr sz="9000" b="1" cap="all"/>
+              <a:defRPr sz="5900" b="1" cap="all"/>
             </a:lvl1pPr>
           </a:lstStyle>
           <a:p>
@@ -930,8 +930,8 @@
         </p:nvSpPr>
         <p:spPr>
           <a:xfrm>
-            <a:off x="1422053" y="7630123"/>
-            <a:ext cx="15301913" cy="3937991"/>
+            <a:off x="1137643" y="3815062"/>
+            <a:ext cx="12241530" cy="1968996"/>
           </a:xfrm>
         </p:spPr>
         <p:txBody>
@@ -939,7 +939,7 @@
           <a:lstStyle>
             <a:lvl1pPr marL="0" indent="0">
               <a:buNone/>
-              <a:defRPr sz="4500">
+              <a:defRPr sz="2900">
                 <a:solidFill>
                   <a:schemeClr val="tx1">
                     <a:tint val="75000"/>
@@ -947,9 +947,9 @@
                 </a:solidFill>
               </a:defRPr>
             </a:lvl1pPr>
-            <a:lvl2pPr marL="1028700" indent="0">
-              <a:buNone/>
-              <a:defRPr sz="4100">
+            <a:lvl2pPr marL="668655" indent="0">
+              <a:buNone/>
+              <a:defRPr sz="2700">
                 <a:solidFill>
                   <a:schemeClr val="tx1">
                     <a:tint val="75000"/>
@@ -957,9 +957,9 @@
                 </a:solidFill>
               </a:defRPr>
             </a:lvl2pPr>
-            <a:lvl3pPr marL="2057400" indent="0">
-              <a:buNone/>
-              <a:defRPr sz="3600">
+            <a:lvl3pPr marL="1337310" indent="0">
+              <a:buNone/>
+              <a:defRPr sz="2300">
                 <a:solidFill>
                   <a:schemeClr val="tx1">
                     <a:tint val="75000"/>
@@ -967,9 +967,9 @@
                 </a:solidFill>
               </a:defRPr>
             </a:lvl3pPr>
-            <a:lvl4pPr marL="3086100" indent="0">
-              <a:buNone/>
-              <a:defRPr sz="3200">
+            <a:lvl4pPr marL="2005965" indent="0">
+              <a:buNone/>
+              <a:defRPr sz="2100">
                 <a:solidFill>
                   <a:schemeClr val="tx1">
                     <a:tint val="75000"/>
@@ -977,9 +977,9 @@
                 </a:solidFill>
               </a:defRPr>
             </a:lvl4pPr>
-            <a:lvl5pPr marL="4114800" indent="0">
-              <a:buNone/>
-              <a:defRPr sz="3200">
+            <a:lvl5pPr marL="2674620" indent="0">
+              <a:buNone/>
+              <a:defRPr sz="2100">
                 <a:solidFill>
                   <a:schemeClr val="tx1">
                     <a:tint val="75000"/>
@@ -987,9 +987,9 @@
                 </a:solidFill>
               </a:defRPr>
             </a:lvl5pPr>
-            <a:lvl6pPr marL="5143500" indent="0">
-              <a:buNone/>
-              <a:defRPr sz="3200">
+            <a:lvl6pPr marL="3343275" indent="0">
+              <a:buNone/>
+              <a:defRPr sz="2100">
                 <a:solidFill>
                   <a:schemeClr val="tx1">
                     <a:tint val="75000"/>
@@ -997,9 +997,9 @@
                 </a:solidFill>
               </a:defRPr>
             </a:lvl6pPr>
-            <a:lvl7pPr marL="6172200" indent="0">
-              <a:buNone/>
-              <a:defRPr sz="3200">
+            <a:lvl7pPr marL="4011930" indent="0">
+              <a:buNone/>
+              <a:defRPr sz="2100">
                 <a:solidFill>
                   <a:schemeClr val="tx1">
                     <a:tint val="75000"/>
@@ -1007,9 +1007,9 @@
                 </a:solidFill>
               </a:defRPr>
             </a:lvl7pPr>
-            <a:lvl8pPr marL="7200900" indent="0">
-              <a:buNone/>
-              <a:defRPr sz="3200">
+            <a:lvl8pPr marL="4680585" indent="0">
+              <a:buNone/>
+              <a:defRPr sz="2100">
                 <a:solidFill>
                   <a:schemeClr val="tx1">
                     <a:tint val="75000"/>
@@ -1017,9 +1017,9 @@
                 </a:solidFill>
               </a:defRPr>
             </a:lvl8pPr>
-            <a:lvl9pPr marL="8229600" indent="0">
-              <a:buNone/>
-              <a:defRPr sz="3200">
+            <a:lvl9pPr marL="5349240" indent="0">
+              <a:buNone/>
+              <a:defRPr sz="2100">
                 <a:solidFill>
                   <a:schemeClr val="tx1">
                     <a:tint val="75000"/>
@@ -1167,39 +1167,39 @@
         </p:nvSpPr>
         <p:spPr>
           <a:xfrm>
-            <a:off x="1772097" y="11026378"/>
-            <a:ext cx="15798849" cy="31187231"/>
+            <a:off x="1417678" y="5513189"/>
+            <a:ext cx="12639079" cy="15593616"/>
           </a:xfrm>
         </p:spPr>
         <p:txBody>
           <a:bodyPr/>
           <a:lstStyle>
             <a:lvl1pPr>
-              <a:defRPr sz="6300"/>
+              <a:defRPr sz="4100"/>
             </a:lvl1pPr>
             <a:lvl2pPr>
-              <a:defRPr sz="5400"/>
+              <a:defRPr sz="3500"/>
             </a:lvl2pPr>
             <a:lvl3pPr>
-              <a:defRPr sz="4500"/>
+              <a:defRPr sz="2900"/>
             </a:lvl3pPr>
             <a:lvl4pPr>
-              <a:defRPr sz="4100"/>
+              <a:defRPr sz="2700"/>
             </a:lvl4pPr>
             <a:lvl5pPr>
-              <a:defRPr sz="4100"/>
+              <a:defRPr sz="2700"/>
             </a:lvl5pPr>
             <a:lvl6pPr>
-              <a:defRPr sz="4100"/>
+              <a:defRPr sz="2700"/>
             </a:lvl6pPr>
             <a:lvl7pPr>
-              <a:defRPr sz="4100"/>
+              <a:defRPr sz="2700"/>
             </a:lvl7pPr>
             <a:lvl8pPr>
-              <a:defRPr sz="4100"/>
+              <a:defRPr sz="2700"/>
             </a:lvl8pPr>
             <a:lvl9pPr>
-              <a:defRPr sz="4100"/>
+              <a:defRPr sz="2700"/>
             </a:lvl9pPr>
           </a:lstStyle>
           <a:p>
@@ -1252,39 +1252,39 @@
         </p:nvSpPr>
         <p:spPr>
           <a:xfrm>
-            <a:off x="17870984" y="11026378"/>
-            <a:ext cx="15798851" cy="31187231"/>
+            <a:off x="14296788" y="5513189"/>
+            <a:ext cx="12639081" cy="15593616"/>
           </a:xfrm>
         </p:spPr>
         <p:txBody>
           <a:bodyPr/>
           <a:lstStyle>
             <a:lvl1pPr>
-              <a:defRPr sz="6300"/>
+              <a:defRPr sz="4100"/>
             </a:lvl1pPr>
             <a:lvl2pPr>
-              <a:defRPr sz="5400"/>
+              <a:defRPr sz="3500"/>
             </a:lvl2pPr>
             <a:lvl3pPr>
-              <a:defRPr sz="4500"/>
+              <a:defRPr sz="2900"/>
             </a:lvl3pPr>
             <a:lvl4pPr>
-              <a:defRPr sz="4100"/>
+              <a:defRPr sz="2700"/>
             </a:lvl4pPr>
             <a:lvl5pPr>
-              <a:defRPr sz="4100"/>
+              <a:defRPr sz="2700"/>
             </a:lvl5pPr>
             <a:lvl6pPr>
-              <a:defRPr sz="4100"/>
+              <a:defRPr sz="2700"/>
             </a:lvl6pPr>
             <a:lvl7pPr>
-              <a:defRPr sz="4100"/>
+              <a:defRPr sz="2700"/>
             </a:lvl7pPr>
             <a:lvl8pPr>
-              <a:defRPr sz="4100"/>
+              <a:defRPr sz="2700"/>
             </a:lvl8pPr>
             <a:lvl9pPr>
-              <a:defRPr sz="4100"/>
+              <a:defRPr sz="2700"/>
             </a:lvl9pPr>
           </a:lstStyle>
           <a:p>
@@ -1432,8 +1432,8 @@
         </p:nvSpPr>
         <p:spPr>
           <a:xfrm>
-            <a:off x="900113" y="720925"/>
-            <a:ext cx="16202025" cy="3000375"/>
+            <a:off x="720091" y="360463"/>
+            <a:ext cx="12961620" cy="1500188"/>
           </a:xfrm>
         </p:spPr>
         <p:txBody>
@@ -1464,8 +1464,8 @@
         </p:nvSpPr>
         <p:spPr>
           <a:xfrm>
-            <a:off x="900113" y="4029672"/>
-            <a:ext cx="7954120" cy="1679375"/>
+            <a:off x="720090" y="2014836"/>
+            <a:ext cx="6363296" cy="839688"/>
           </a:xfrm>
         </p:spPr>
         <p:txBody>
@@ -1473,39 +1473,39 @@
           <a:lstStyle>
             <a:lvl1pPr marL="0" indent="0">
               <a:buNone/>
-              <a:defRPr sz="5400" b="1"/>
+              <a:defRPr sz="3500" b="1"/>
             </a:lvl1pPr>
-            <a:lvl2pPr marL="1028700" indent="0">
-              <a:buNone/>
-              <a:defRPr sz="4500" b="1"/>
+            <a:lvl2pPr marL="668655" indent="0">
+              <a:buNone/>
+              <a:defRPr sz="2900" b="1"/>
             </a:lvl2pPr>
-            <a:lvl3pPr marL="2057400" indent="0">
-              <a:buNone/>
-              <a:defRPr sz="4100" b="1"/>
+            <a:lvl3pPr marL="1337310" indent="0">
+              <a:buNone/>
+              <a:defRPr sz="2700" b="1"/>
             </a:lvl3pPr>
-            <a:lvl4pPr marL="3086100" indent="0">
-              <a:buNone/>
-              <a:defRPr sz="3600" b="1"/>
+            <a:lvl4pPr marL="2005965" indent="0">
+              <a:buNone/>
+              <a:defRPr sz="2300" b="1"/>
             </a:lvl4pPr>
-            <a:lvl5pPr marL="4114800" indent="0">
-              <a:buNone/>
-              <a:defRPr sz="3600" b="1"/>
+            <a:lvl5pPr marL="2674620" indent="0">
+              <a:buNone/>
+              <a:defRPr sz="2300" b="1"/>
             </a:lvl5pPr>
-            <a:lvl6pPr marL="5143500" indent="0">
-              <a:buNone/>
-              <a:defRPr sz="3600" b="1"/>
+            <a:lvl6pPr marL="3343275" indent="0">
+              <a:buNone/>
+              <a:defRPr sz="2300" b="1"/>
             </a:lvl6pPr>
-            <a:lvl7pPr marL="6172200" indent="0">
-              <a:buNone/>
-              <a:defRPr sz="3600" b="1"/>
+            <a:lvl7pPr marL="4011930" indent="0">
+              <a:buNone/>
+              <a:defRPr sz="2300" b="1"/>
             </a:lvl7pPr>
-            <a:lvl8pPr marL="7200900" indent="0">
-              <a:buNone/>
-              <a:defRPr sz="3600" b="1"/>
+            <a:lvl8pPr marL="4680585" indent="0">
+              <a:buNone/>
+              <a:defRPr sz="2300" b="1"/>
             </a:lvl8pPr>
-            <a:lvl9pPr marL="8229600" indent="0">
-              <a:buNone/>
-              <a:defRPr sz="3600" b="1"/>
+            <a:lvl9pPr marL="5349240" indent="0">
+              <a:buNone/>
+              <a:defRPr sz="2300" b="1"/>
             </a:lvl9pPr>
           </a:lstStyle>
           <a:p>
@@ -1529,39 +1529,39 @@
         </p:nvSpPr>
         <p:spPr>
           <a:xfrm>
-            <a:off x="900113" y="5709047"/>
-            <a:ext cx="7954120" cy="10372131"/>
+            <a:off x="720090" y="2854524"/>
+            <a:ext cx="6363296" cy="5186066"/>
           </a:xfrm>
         </p:spPr>
         <p:txBody>
           <a:bodyPr/>
           <a:lstStyle>
             <a:lvl1pPr>
-              <a:defRPr sz="5400"/>
+              <a:defRPr sz="3500"/>
             </a:lvl1pPr>
             <a:lvl2pPr>
-              <a:defRPr sz="4500"/>
+              <a:defRPr sz="2900"/>
             </a:lvl2pPr>
             <a:lvl3pPr>
-              <a:defRPr sz="4100"/>
+              <a:defRPr sz="2700"/>
             </a:lvl3pPr>
             <a:lvl4pPr>
-              <a:defRPr sz="3600"/>
+              <a:defRPr sz="2300"/>
             </a:lvl4pPr>
             <a:lvl5pPr>
-              <a:defRPr sz="3600"/>
+              <a:defRPr sz="2300"/>
             </a:lvl5pPr>
             <a:lvl6pPr>
-              <a:defRPr sz="3600"/>
+              <a:defRPr sz="2300"/>
             </a:lvl6pPr>
             <a:lvl7pPr>
-              <a:defRPr sz="3600"/>
+              <a:defRPr sz="2300"/>
             </a:lvl7pPr>
             <a:lvl8pPr>
-              <a:defRPr sz="3600"/>
+              <a:defRPr sz="2300"/>
             </a:lvl8pPr>
             <a:lvl9pPr>
-              <a:defRPr sz="3600"/>
+              <a:defRPr sz="2300"/>
             </a:lvl9pPr>
           </a:lstStyle>
           <a:p>
@@ -1614,8 +1614,8 @@
         </p:nvSpPr>
         <p:spPr>
           <a:xfrm>
-            <a:off x="9144894" y="4029672"/>
-            <a:ext cx="7957245" cy="1679375"/>
+            <a:off x="7315916" y="2014836"/>
+            <a:ext cx="6365796" cy="839688"/>
           </a:xfrm>
         </p:spPr>
         <p:txBody>
@@ -1623,39 +1623,39 @@
           <a:lstStyle>
             <a:lvl1pPr marL="0" indent="0">
               <a:buNone/>
-              <a:defRPr sz="5400" b="1"/>
+              <a:defRPr sz="3500" b="1"/>
             </a:lvl1pPr>
-            <a:lvl2pPr marL="1028700" indent="0">
-              <a:buNone/>
-              <a:defRPr sz="4500" b="1"/>
+            <a:lvl2pPr marL="668655" indent="0">
+              <a:buNone/>
+              <a:defRPr sz="2900" b="1"/>
             </a:lvl2pPr>
-            <a:lvl3pPr marL="2057400" indent="0">
-              <a:buNone/>
-              <a:defRPr sz="4100" b="1"/>
+            <a:lvl3pPr marL="1337310" indent="0">
+              <a:buNone/>
+              <a:defRPr sz="2700" b="1"/>
             </a:lvl3pPr>
-            <a:lvl4pPr marL="3086100" indent="0">
-              <a:buNone/>
-              <a:defRPr sz="3600" b="1"/>
+            <a:lvl4pPr marL="2005965" indent="0">
+              <a:buNone/>
+              <a:defRPr sz="2300" b="1"/>
             </a:lvl4pPr>
-            <a:lvl5pPr marL="4114800" indent="0">
-              <a:buNone/>
-              <a:defRPr sz="3600" b="1"/>
+            <a:lvl5pPr marL="2674620" indent="0">
+              <a:buNone/>
+              <a:defRPr sz="2300" b="1"/>
             </a:lvl5pPr>
-            <a:lvl6pPr marL="5143500" indent="0">
-              <a:buNone/>
-              <a:defRPr sz="3600" b="1"/>
+            <a:lvl6pPr marL="3343275" indent="0">
+              <a:buNone/>
+              <a:defRPr sz="2300" b="1"/>
             </a:lvl6pPr>
-            <a:lvl7pPr marL="6172200" indent="0">
-              <a:buNone/>
-              <a:defRPr sz="3600" b="1"/>
+            <a:lvl7pPr marL="4011930" indent="0">
+              <a:buNone/>
+              <a:defRPr sz="2300" b="1"/>
             </a:lvl7pPr>
-            <a:lvl8pPr marL="7200900" indent="0">
-              <a:buNone/>
-              <a:defRPr sz="3600" b="1"/>
+            <a:lvl8pPr marL="4680585" indent="0">
+              <a:buNone/>
+              <a:defRPr sz="2300" b="1"/>
             </a:lvl8pPr>
-            <a:lvl9pPr marL="8229600" indent="0">
-              <a:buNone/>
-              <a:defRPr sz="3600" b="1"/>
+            <a:lvl9pPr marL="5349240" indent="0">
+              <a:buNone/>
+              <a:defRPr sz="2300" b="1"/>
             </a:lvl9pPr>
           </a:lstStyle>
           <a:p>
@@ -1679,39 +1679,39 @@
         </p:nvSpPr>
         <p:spPr>
           <a:xfrm>
-            <a:off x="9144894" y="5709047"/>
-            <a:ext cx="7957245" cy="10372131"/>
+            <a:off x="7315916" y="2854524"/>
+            <a:ext cx="6365796" cy="5186066"/>
           </a:xfrm>
         </p:spPr>
         <p:txBody>
           <a:bodyPr/>
           <a:lstStyle>
             <a:lvl1pPr>
-              <a:defRPr sz="5400"/>
+              <a:defRPr sz="3500"/>
             </a:lvl1pPr>
             <a:lvl2pPr>
-              <a:defRPr sz="4500"/>
+              <a:defRPr sz="2900"/>
             </a:lvl2pPr>
             <a:lvl3pPr>
-              <a:defRPr sz="4100"/>
+              <a:defRPr sz="2700"/>
             </a:lvl3pPr>
             <a:lvl4pPr>
-              <a:defRPr sz="3600"/>
+              <a:defRPr sz="2300"/>
             </a:lvl4pPr>
             <a:lvl5pPr>
-              <a:defRPr sz="3600"/>
+              <a:defRPr sz="2300"/>
             </a:lvl5pPr>
             <a:lvl6pPr>
-              <a:defRPr sz="3600"/>
+              <a:defRPr sz="2300"/>
             </a:lvl6pPr>
             <a:lvl7pPr>
-              <a:defRPr sz="3600"/>
+              <a:defRPr sz="2300"/>
             </a:lvl7pPr>
             <a:lvl8pPr>
-              <a:defRPr sz="3600"/>
+              <a:defRPr sz="2300"/>
             </a:lvl8pPr>
             <a:lvl9pPr>
-              <a:defRPr sz="3600"/>
+              <a:defRPr sz="2300"/>
             </a:lvl9pPr>
           </a:lstStyle>
           <a:p>
@@ -2072,15 +2072,15 @@
         </p:nvSpPr>
         <p:spPr>
           <a:xfrm>
-            <a:off x="900114" y="716756"/>
-            <a:ext cx="5922616" cy="3050381"/>
+            <a:off x="720091" y="358378"/>
+            <a:ext cx="4738093" cy="1525191"/>
           </a:xfrm>
         </p:spPr>
         <p:txBody>
           <a:bodyPr anchor="b"/>
           <a:lstStyle>
             <a:lvl1pPr algn="l">
-              <a:defRPr sz="4500" b="1"/>
+              <a:defRPr sz="2900" b="1"/>
             </a:lvl1pPr>
           </a:lstStyle>
           <a:p>
@@ -2104,39 +2104,39 @@
         </p:nvSpPr>
         <p:spPr>
           <a:xfrm>
-            <a:off x="7038380" y="716757"/>
-            <a:ext cx="10063758" cy="15364422"/>
+            <a:off x="5630704" y="358379"/>
+            <a:ext cx="8051006" cy="7682211"/>
           </a:xfrm>
         </p:spPr>
         <p:txBody>
           <a:bodyPr/>
           <a:lstStyle>
             <a:lvl1pPr>
-              <a:defRPr sz="7200"/>
+              <a:defRPr sz="4700"/>
             </a:lvl1pPr>
             <a:lvl2pPr>
-              <a:defRPr sz="6300"/>
+              <a:defRPr sz="4100"/>
             </a:lvl2pPr>
             <a:lvl3pPr>
-              <a:defRPr sz="5400"/>
+              <a:defRPr sz="3500"/>
             </a:lvl3pPr>
             <a:lvl4pPr>
-              <a:defRPr sz="4500"/>
+              <a:defRPr sz="2900"/>
             </a:lvl4pPr>
             <a:lvl5pPr>
-              <a:defRPr sz="4500"/>
+              <a:defRPr sz="2900"/>
             </a:lvl5pPr>
             <a:lvl6pPr>
-              <a:defRPr sz="4500"/>
+              <a:defRPr sz="2900"/>
             </a:lvl6pPr>
             <a:lvl7pPr>
-              <a:defRPr sz="4500"/>
+              <a:defRPr sz="2900"/>
             </a:lvl7pPr>
             <a:lvl8pPr>
-              <a:defRPr sz="4500"/>
+              <a:defRPr sz="2900"/>
             </a:lvl8pPr>
             <a:lvl9pPr>
-              <a:defRPr sz="4500"/>
+              <a:defRPr sz="2900"/>
             </a:lvl9pPr>
           </a:lstStyle>
           <a:p>
@@ -2189,8 +2189,8 @@
         </p:nvSpPr>
         <p:spPr>
           <a:xfrm>
-            <a:off x="900114" y="3767139"/>
-            <a:ext cx="5922616" cy="12314040"/>
+            <a:off x="720091" y="1883570"/>
+            <a:ext cx="4738093" cy="6157020"/>
           </a:xfrm>
         </p:spPr>
         <p:txBody>
@@ -2198,39 +2198,39 @@
           <a:lstStyle>
             <a:lvl1pPr marL="0" indent="0">
               <a:buNone/>
-              <a:defRPr sz="3200"/>
+              <a:defRPr sz="2100"/>
             </a:lvl1pPr>
-            <a:lvl2pPr marL="1028700" indent="0">
-              <a:buNone/>
-              <a:defRPr sz="2700"/>
+            <a:lvl2pPr marL="668655" indent="0">
+              <a:buNone/>
+              <a:defRPr sz="1800"/>
             </a:lvl2pPr>
-            <a:lvl3pPr marL="2057400" indent="0">
-              <a:buNone/>
-              <a:defRPr sz="2300"/>
+            <a:lvl3pPr marL="1337310" indent="0">
+              <a:buNone/>
+              <a:defRPr sz="1500"/>
             </a:lvl3pPr>
-            <a:lvl4pPr marL="3086100" indent="0">
-              <a:buNone/>
-              <a:defRPr sz="2000"/>
+            <a:lvl4pPr marL="2005965" indent="0">
+              <a:buNone/>
+              <a:defRPr sz="1300"/>
             </a:lvl4pPr>
-            <a:lvl5pPr marL="4114800" indent="0">
-              <a:buNone/>
-              <a:defRPr sz="2000"/>
+            <a:lvl5pPr marL="2674620" indent="0">
+              <a:buNone/>
+              <a:defRPr sz="1300"/>
             </a:lvl5pPr>
-            <a:lvl6pPr marL="5143500" indent="0">
-              <a:buNone/>
-              <a:defRPr sz="2000"/>
+            <a:lvl6pPr marL="3343275" indent="0">
+              <a:buNone/>
+              <a:defRPr sz="1300"/>
             </a:lvl6pPr>
-            <a:lvl7pPr marL="6172200" indent="0">
-              <a:buNone/>
-              <a:defRPr sz="2000"/>
+            <a:lvl7pPr marL="4011930" indent="0">
+              <a:buNone/>
+              <a:defRPr sz="1300"/>
             </a:lvl7pPr>
-            <a:lvl8pPr marL="7200900" indent="0">
-              <a:buNone/>
-              <a:defRPr sz="2000"/>
+            <a:lvl8pPr marL="4680585" indent="0">
+              <a:buNone/>
+              <a:defRPr sz="1300"/>
             </a:lvl8pPr>
-            <a:lvl9pPr marL="8229600" indent="0">
-              <a:buNone/>
-              <a:defRPr sz="2000"/>
+            <a:lvl9pPr marL="5349240" indent="0">
+              <a:buNone/>
+              <a:defRPr sz="1300"/>
             </a:lvl9pPr>
           </a:lstStyle>
           <a:p>
@@ -2349,15 +2349,15 @@
         </p:nvSpPr>
         <p:spPr>
           <a:xfrm>
-            <a:off x="3528567" y="12601575"/>
-            <a:ext cx="10801350" cy="1487687"/>
+            <a:off x="2822854" y="6300788"/>
+            <a:ext cx="8641080" cy="743844"/>
           </a:xfrm>
         </p:spPr>
         <p:txBody>
           <a:bodyPr anchor="b"/>
           <a:lstStyle>
             <a:lvl1pPr algn="l">
-              <a:defRPr sz="4500" b="1"/>
+              <a:defRPr sz="2900" b="1"/>
             </a:lvl1pPr>
           </a:lstStyle>
           <a:p>
@@ -2381,8 +2381,8 @@
         </p:nvSpPr>
         <p:spPr>
           <a:xfrm>
-            <a:off x="3528567" y="1608534"/>
-            <a:ext cx="10801350" cy="10801350"/>
+            <a:off x="2822854" y="804267"/>
+            <a:ext cx="8641080" cy="5400675"/>
           </a:xfrm>
         </p:spPr>
         <p:txBody>
@@ -2390,39 +2390,39 @@
           <a:lstStyle>
             <a:lvl1pPr marL="0" indent="0">
               <a:buNone/>
-              <a:defRPr sz="7200"/>
+              <a:defRPr sz="4700"/>
             </a:lvl1pPr>
-            <a:lvl2pPr marL="1028700" indent="0">
-              <a:buNone/>
-              <a:defRPr sz="6300"/>
+            <a:lvl2pPr marL="668655" indent="0">
+              <a:buNone/>
+              <a:defRPr sz="4100"/>
             </a:lvl2pPr>
-            <a:lvl3pPr marL="2057400" indent="0">
-              <a:buNone/>
-              <a:defRPr sz="5400"/>
+            <a:lvl3pPr marL="1337310" indent="0">
+              <a:buNone/>
+              <a:defRPr sz="3500"/>
             </a:lvl3pPr>
-            <a:lvl4pPr marL="3086100" indent="0">
-              <a:buNone/>
-              <a:defRPr sz="4500"/>
+            <a:lvl4pPr marL="2005965" indent="0">
+              <a:buNone/>
+              <a:defRPr sz="2900"/>
             </a:lvl4pPr>
-            <a:lvl5pPr marL="4114800" indent="0">
-              <a:buNone/>
-              <a:defRPr sz="4500"/>
+            <a:lvl5pPr marL="2674620" indent="0">
+              <a:buNone/>
+              <a:defRPr sz="2900"/>
             </a:lvl5pPr>
-            <a:lvl6pPr marL="5143500" indent="0">
-              <a:buNone/>
-              <a:defRPr sz="4500"/>
+            <a:lvl6pPr marL="3343275" indent="0">
+              <a:buNone/>
+              <a:defRPr sz="2900"/>
             </a:lvl6pPr>
-            <a:lvl7pPr marL="6172200" indent="0">
-              <a:buNone/>
-              <a:defRPr sz="4500"/>
+            <a:lvl7pPr marL="4011930" indent="0">
+              <a:buNone/>
+              <a:defRPr sz="2900"/>
             </a:lvl7pPr>
-            <a:lvl8pPr marL="7200900" indent="0">
-              <a:buNone/>
-              <a:defRPr sz="4500"/>
+            <a:lvl8pPr marL="4680585" indent="0">
+              <a:buNone/>
+              <a:defRPr sz="2900"/>
             </a:lvl8pPr>
-            <a:lvl9pPr marL="8229600" indent="0">
-              <a:buNone/>
-              <a:defRPr sz="4500"/>
+            <a:lvl9pPr marL="5349240" indent="0">
+              <a:buNone/>
+              <a:defRPr sz="2900"/>
             </a:lvl9pPr>
           </a:lstStyle>
           <a:p>
@@ -2442,8 +2442,8 @@
         </p:nvSpPr>
         <p:spPr>
           <a:xfrm>
-            <a:off x="3528567" y="14089262"/>
-            <a:ext cx="10801350" cy="2112763"/>
+            <a:off x="2822854" y="7044631"/>
+            <a:ext cx="8641080" cy="1056382"/>
           </a:xfrm>
         </p:spPr>
         <p:txBody>
@@ -2451,39 +2451,39 @@
           <a:lstStyle>
             <a:lvl1pPr marL="0" indent="0">
               <a:buNone/>
-              <a:defRPr sz="3200"/>
+              <a:defRPr sz="2100"/>
             </a:lvl1pPr>
-            <a:lvl2pPr marL="1028700" indent="0">
-              <a:buNone/>
-              <a:defRPr sz="2700"/>
+            <a:lvl2pPr marL="668655" indent="0">
+              <a:buNone/>
+              <a:defRPr sz="1800"/>
             </a:lvl2pPr>
-            <a:lvl3pPr marL="2057400" indent="0">
-              <a:buNone/>
-              <a:defRPr sz="2300"/>
+            <a:lvl3pPr marL="1337310" indent="0">
+              <a:buNone/>
+              <a:defRPr sz="1500"/>
             </a:lvl3pPr>
-            <a:lvl4pPr marL="3086100" indent="0">
-              <a:buNone/>
-              <a:defRPr sz="2000"/>
+            <a:lvl4pPr marL="2005965" indent="0">
+              <a:buNone/>
+              <a:defRPr sz="1300"/>
             </a:lvl4pPr>
-            <a:lvl5pPr marL="4114800" indent="0">
-              <a:buNone/>
-              <a:defRPr sz="2000"/>
+            <a:lvl5pPr marL="2674620" indent="0">
+              <a:buNone/>
+              <a:defRPr sz="1300"/>
             </a:lvl5pPr>
-            <a:lvl6pPr marL="5143500" indent="0">
-              <a:buNone/>
-              <a:defRPr sz="2000"/>
+            <a:lvl6pPr marL="3343275" indent="0">
+              <a:buNone/>
+              <a:defRPr sz="1300"/>
             </a:lvl6pPr>
-            <a:lvl7pPr marL="6172200" indent="0">
-              <a:buNone/>
-              <a:defRPr sz="2000"/>
+            <a:lvl7pPr marL="4011930" indent="0">
+              <a:buNone/>
+              <a:defRPr sz="1300"/>
             </a:lvl7pPr>
-            <a:lvl8pPr marL="7200900" indent="0">
-              <a:buNone/>
-              <a:defRPr sz="2000"/>
+            <a:lvl8pPr marL="4680585" indent="0">
+              <a:buNone/>
+              <a:defRPr sz="1300"/>
             </a:lvl8pPr>
-            <a:lvl9pPr marL="8229600" indent="0">
-              <a:buNone/>
-              <a:defRPr sz="2000"/>
+            <a:lvl9pPr marL="5349240" indent="0">
+              <a:buNone/>
+              <a:defRPr sz="1300"/>
             </a:lvl9pPr>
           </a:lstStyle>
           <a:p>
@@ -2607,15 +2607,15 @@
         </p:nvSpPr>
         <p:spPr>
           <a:xfrm>
-            <a:off x="900113" y="720925"/>
-            <a:ext cx="16202025" cy="3000375"/>
+            <a:off x="720091" y="360463"/>
+            <a:ext cx="12961620" cy="1500188"/>
           </a:xfrm>
           <a:prstGeom prst="rect">
             <a:avLst/>
           </a:prstGeom>
         </p:spPr>
         <p:txBody>
-          <a:bodyPr vert="horz" lIns="205740" tIns="102870" rIns="205740" bIns="102870" rtlCol="0" anchor="ctr">
+          <a:bodyPr vert="horz" lIns="133731" tIns="66866" rIns="133731" bIns="66866" rtlCol="0" anchor="ctr">
             <a:normAutofit/>
           </a:bodyPr>
           <a:lstStyle/>
@@ -2640,15 +2640,15 @@
         </p:nvSpPr>
         <p:spPr>
           <a:xfrm>
-            <a:off x="900113" y="4200526"/>
-            <a:ext cx="16202025" cy="11880653"/>
+            <a:off x="720091" y="2100263"/>
+            <a:ext cx="12961620" cy="5940327"/>
           </a:xfrm>
           <a:prstGeom prst="rect">
             <a:avLst/>
           </a:prstGeom>
         </p:spPr>
         <p:txBody>
-          <a:bodyPr vert="horz" lIns="205740" tIns="102870" rIns="205740" bIns="102870" rtlCol="0">
+          <a:bodyPr vert="horz" lIns="133731" tIns="66866" rIns="133731" bIns="66866" rtlCol="0">
             <a:normAutofit/>
           </a:bodyPr>
           <a:lstStyle/>
@@ -2702,18 +2702,18 @@
         </p:nvSpPr>
         <p:spPr>
           <a:xfrm>
-            <a:off x="900113" y="16685420"/>
-            <a:ext cx="4200525" cy="958453"/>
+            <a:off x="720091" y="8342710"/>
+            <a:ext cx="3360420" cy="479227"/>
           </a:xfrm>
           <a:prstGeom prst="rect">
             <a:avLst/>
           </a:prstGeom>
         </p:spPr>
         <p:txBody>
-          <a:bodyPr vert="horz" lIns="205740" tIns="102870" rIns="205740" bIns="102870" rtlCol="0" anchor="ctr"/>
+          <a:bodyPr vert="horz" lIns="133731" tIns="66866" rIns="133731" bIns="66866" rtlCol="0" anchor="ctr"/>
           <a:lstStyle>
             <a:lvl1pPr algn="l">
-              <a:defRPr sz="2700">
+              <a:defRPr sz="1800">
                 <a:solidFill>
                   <a:schemeClr val="tx1">
                     <a:tint val="75000"/>
@@ -2743,18 +2743,18 @@
         </p:nvSpPr>
         <p:spPr>
           <a:xfrm>
-            <a:off x="6150769" y="16685420"/>
-            <a:ext cx="5700713" cy="958453"/>
+            <a:off x="4920616" y="8342710"/>
+            <a:ext cx="4560570" cy="479227"/>
           </a:xfrm>
           <a:prstGeom prst="rect">
             <a:avLst/>
           </a:prstGeom>
         </p:spPr>
         <p:txBody>
-          <a:bodyPr vert="horz" lIns="205740" tIns="102870" rIns="205740" bIns="102870" rtlCol="0" anchor="ctr"/>
+          <a:bodyPr vert="horz" lIns="133731" tIns="66866" rIns="133731" bIns="66866" rtlCol="0" anchor="ctr"/>
           <a:lstStyle>
             <a:lvl1pPr algn="ctr">
-              <a:defRPr sz="2700">
+              <a:defRPr sz="1800">
                 <a:solidFill>
                   <a:schemeClr val="tx1">
                     <a:tint val="75000"/>
@@ -2780,18 +2780,18 @@
         </p:nvSpPr>
         <p:spPr>
           <a:xfrm>
-            <a:off x="12901613" y="16685420"/>
-            <a:ext cx="4200525" cy="958453"/>
+            <a:off x="10321291" y="8342710"/>
+            <a:ext cx="3360420" cy="479227"/>
           </a:xfrm>
           <a:prstGeom prst="rect">
             <a:avLst/>
           </a:prstGeom>
         </p:spPr>
         <p:txBody>
-          <a:bodyPr vert="horz" lIns="205740" tIns="102870" rIns="205740" bIns="102870" rtlCol="0" anchor="ctr"/>
+          <a:bodyPr vert="horz" lIns="133731" tIns="66866" rIns="133731" bIns="66866" rtlCol="0" anchor="ctr"/>
           <a:lstStyle>
             <a:lvl1pPr algn="r">
-              <a:defRPr sz="2700">
+              <a:defRPr sz="1800">
                 <a:solidFill>
                   <a:schemeClr val="tx1">
                     <a:tint val="75000"/>
@@ -2832,12 +2832,12 @@
   </p:sldLayoutIdLst>
   <p:txStyles>
     <p:titleStyle>
-      <a:lvl1pPr algn="ctr" defTabSz="2057400" rtl="0" eaLnBrk="1" latinLnBrk="0" hangingPunct="1">
+      <a:lvl1pPr algn="ctr" defTabSz="1337310" rtl="0" eaLnBrk="1" latinLnBrk="0" hangingPunct="1">
         <a:spcBef>
           <a:spcPct val="0"/>
         </a:spcBef>
         <a:buNone/>
-        <a:defRPr sz="9900" kern="1200">
+        <a:defRPr sz="6400" kern="1200">
           <a:solidFill>
             <a:schemeClr val="tx1"/>
           </a:solidFill>
@@ -2848,13 +2848,13 @@
       </a:lvl1pPr>
     </p:titleStyle>
     <p:bodyStyle>
-      <a:lvl1pPr marL="771525" indent="-771525" algn="l" defTabSz="2057400" rtl="0" eaLnBrk="1" latinLnBrk="0" hangingPunct="1">
+      <a:lvl1pPr marL="501491" indent="-501491" algn="l" defTabSz="1337310" rtl="0" eaLnBrk="1" latinLnBrk="0" hangingPunct="1">
         <a:spcBef>
           <a:spcPct val="20000"/>
         </a:spcBef>
         <a:buFont typeface="Arial" panose="020B0604020202020204" pitchFamily="34" charset="0"/>
         <a:buChar char="•"/>
-        <a:defRPr sz="7200" kern="1200">
+        <a:defRPr sz="4700" kern="1200">
           <a:solidFill>
             <a:schemeClr val="tx1"/>
           </a:solidFill>
@@ -2863,13 +2863,13 @@
           <a:cs typeface="+mn-cs"/>
         </a:defRPr>
       </a:lvl1pPr>
-      <a:lvl2pPr marL="1671638" indent="-642938" algn="l" defTabSz="2057400" rtl="0" eaLnBrk="1" latinLnBrk="0" hangingPunct="1">
+      <a:lvl2pPr marL="1086565" indent="-417910" algn="l" defTabSz="1337310" rtl="0" eaLnBrk="1" latinLnBrk="0" hangingPunct="1">
         <a:spcBef>
           <a:spcPct val="20000"/>
         </a:spcBef>
         <a:buFont typeface="Arial" panose="020B0604020202020204" pitchFamily="34" charset="0"/>
         <a:buChar char="–"/>
-        <a:defRPr sz="6300" kern="1200">
+        <a:defRPr sz="4100" kern="1200">
           <a:solidFill>
             <a:schemeClr val="tx1"/>
           </a:solidFill>
@@ -2878,13 +2878,13 @@
           <a:cs typeface="+mn-cs"/>
         </a:defRPr>
       </a:lvl2pPr>
-      <a:lvl3pPr marL="2571750" indent="-514350" algn="l" defTabSz="2057400" rtl="0" eaLnBrk="1" latinLnBrk="0" hangingPunct="1">
+      <a:lvl3pPr marL="1671638" indent="-334328" algn="l" defTabSz="1337310" rtl="0" eaLnBrk="1" latinLnBrk="0" hangingPunct="1">
         <a:spcBef>
           <a:spcPct val="20000"/>
         </a:spcBef>
         <a:buFont typeface="Arial" panose="020B0604020202020204" pitchFamily="34" charset="0"/>
         <a:buChar char="•"/>
-        <a:defRPr sz="5400" kern="1200">
+        <a:defRPr sz="3500" kern="1200">
           <a:solidFill>
             <a:schemeClr val="tx1"/>
           </a:solidFill>
@@ -2893,13 +2893,13 @@
           <a:cs typeface="+mn-cs"/>
         </a:defRPr>
       </a:lvl3pPr>
-      <a:lvl4pPr marL="3600450" indent="-514350" algn="l" defTabSz="2057400" rtl="0" eaLnBrk="1" latinLnBrk="0" hangingPunct="1">
+      <a:lvl4pPr marL="2340293" indent="-334328" algn="l" defTabSz="1337310" rtl="0" eaLnBrk="1" latinLnBrk="0" hangingPunct="1">
         <a:spcBef>
           <a:spcPct val="20000"/>
         </a:spcBef>
         <a:buFont typeface="Arial" panose="020B0604020202020204" pitchFamily="34" charset="0"/>
         <a:buChar char="–"/>
-        <a:defRPr sz="4500" kern="1200">
+        <a:defRPr sz="2900" kern="1200">
           <a:solidFill>
             <a:schemeClr val="tx1"/>
           </a:solidFill>
@@ -2908,13 +2908,13 @@
           <a:cs typeface="+mn-cs"/>
         </a:defRPr>
       </a:lvl4pPr>
-      <a:lvl5pPr marL="4629150" indent="-514350" algn="l" defTabSz="2057400" rtl="0" eaLnBrk="1" latinLnBrk="0" hangingPunct="1">
+      <a:lvl5pPr marL="3008948" indent="-334328" algn="l" defTabSz="1337310" rtl="0" eaLnBrk="1" latinLnBrk="0" hangingPunct="1">
         <a:spcBef>
           <a:spcPct val="20000"/>
         </a:spcBef>
         <a:buFont typeface="Arial" panose="020B0604020202020204" pitchFamily="34" charset="0"/>
         <a:buChar char="»"/>
-        <a:defRPr sz="4500" kern="1200">
+        <a:defRPr sz="2900" kern="1200">
           <a:solidFill>
             <a:schemeClr val="tx1"/>
           </a:solidFill>
@@ -2923,13 +2923,13 @@
           <a:cs typeface="+mn-cs"/>
         </a:defRPr>
       </a:lvl5pPr>
-      <a:lvl6pPr marL="5657850" indent="-514350" algn="l" defTabSz="2057400" rtl="0" eaLnBrk="1" latinLnBrk="0" hangingPunct="1">
+      <a:lvl6pPr marL="3677603" indent="-334328" algn="l" defTabSz="1337310" rtl="0" eaLnBrk="1" latinLnBrk="0" hangingPunct="1">
         <a:spcBef>
           <a:spcPct val="20000"/>
         </a:spcBef>
         <a:buFont typeface="Arial" panose="020B0604020202020204" pitchFamily="34" charset="0"/>
         <a:buChar char="•"/>
-        <a:defRPr sz="4500" kern="1200">
+        <a:defRPr sz="2900" kern="1200">
           <a:solidFill>
             <a:schemeClr val="tx1"/>
           </a:solidFill>
@@ -2938,13 +2938,13 @@
           <a:cs typeface="+mn-cs"/>
         </a:defRPr>
       </a:lvl6pPr>
-      <a:lvl7pPr marL="6686550" indent="-514350" algn="l" defTabSz="2057400" rtl="0" eaLnBrk="1" latinLnBrk="0" hangingPunct="1">
+      <a:lvl7pPr marL="4346258" indent="-334328" algn="l" defTabSz="1337310" rtl="0" eaLnBrk="1" latinLnBrk="0" hangingPunct="1">
         <a:spcBef>
           <a:spcPct val="20000"/>
         </a:spcBef>
         <a:buFont typeface="Arial" panose="020B0604020202020204" pitchFamily="34" charset="0"/>
         <a:buChar char="•"/>
-        <a:defRPr sz="4500" kern="1200">
+        <a:defRPr sz="2900" kern="1200">
           <a:solidFill>
             <a:schemeClr val="tx1"/>
           </a:solidFill>
@@ -2953,13 +2953,13 @@
           <a:cs typeface="+mn-cs"/>
         </a:defRPr>
       </a:lvl7pPr>
-      <a:lvl8pPr marL="7715250" indent="-514350" algn="l" defTabSz="2057400" rtl="0" eaLnBrk="1" latinLnBrk="0" hangingPunct="1">
+      <a:lvl8pPr marL="5014913" indent="-334328" algn="l" defTabSz="1337310" rtl="0" eaLnBrk="1" latinLnBrk="0" hangingPunct="1">
         <a:spcBef>
           <a:spcPct val="20000"/>
         </a:spcBef>
         <a:buFont typeface="Arial" panose="020B0604020202020204" pitchFamily="34" charset="0"/>
         <a:buChar char="•"/>
-        <a:defRPr sz="4500" kern="1200">
+        <a:defRPr sz="2900" kern="1200">
           <a:solidFill>
             <a:schemeClr val="tx1"/>
           </a:solidFill>
@@ -2968,13 +2968,13 @@
           <a:cs typeface="+mn-cs"/>
         </a:defRPr>
       </a:lvl8pPr>
-      <a:lvl9pPr marL="8743950" indent="-514350" algn="l" defTabSz="2057400" rtl="0" eaLnBrk="1" latinLnBrk="0" hangingPunct="1">
+      <a:lvl9pPr marL="5683568" indent="-334328" algn="l" defTabSz="1337310" rtl="0" eaLnBrk="1" latinLnBrk="0" hangingPunct="1">
         <a:spcBef>
           <a:spcPct val="20000"/>
         </a:spcBef>
         <a:buFont typeface="Arial" panose="020B0604020202020204" pitchFamily="34" charset="0"/>
         <a:buChar char="•"/>
-        <a:defRPr sz="4500" kern="1200">
+        <a:defRPr sz="2900" kern="1200">
           <a:solidFill>
             <a:schemeClr val="tx1"/>
           </a:solidFill>
@@ -2988,8 +2988,8 @@
       <a:defPPr>
         <a:defRPr lang="en-US"/>
       </a:defPPr>
-      <a:lvl1pPr marL="0" algn="l" defTabSz="2057400" rtl="0" eaLnBrk="1" latinLnBrk="0" hangingPunct="1">
-        <a:defRPr sz="4100" kern="1200">
+      <a:lvl1pPr marL="0" algn="l" defTabSz="1337310" rtl="0" eaLnBrk="1" latinLnBrk="0" hangingPunct="1">
+        <a:defRPr sz="2700" kern="1200">
           <a:solidFill>
             <a:schemeClr val="tx1"/>
           </a:solidFill>
@@ -2998,8 +2998,8 @@
           <a:cs typeface="+mn-cs"/>
         </a:defRPr>
       </a:lvl1pPr>
-      <a:lvl2pPr marL="1028700" algn="l" defTabSz="2057400" rtl="0" eaLnBrk="1" latinLnBrk="0" hangingPunct="1">
-        <a:defRPr sz="4100" kern="1200">
+      <a:lvl2pPr marL="668655" algn="l" defTabSz="1337310" rtl="0" eaLnBrk="1" latinLnBrk="0" hangingPunct="1">
+        <a:defRPr sz="2700" kern="1200">
           <a:solidFill>
             <a:schemeClr val="tx1"/>
           </a:solidFill>
@@ -3008,8 +3008,8 @@
           <a:cs typeface="+mn-cs"/>
         </a:defRPr>
       </a:lvl2pPr>
-      <a:lvl3pPr marL="2057400" algn="l" defTabSz="2057400" rtl="0" eaLnBrk="1" latinLnBrk="0" hangingPunct="1">
-        <a:defRPr sz="4100" kern="1200">
+      <a:lvl3pPr marL="1337310" algn="l" defTabSz="1337310" rtl="0" eaLnBrk="1" latinLnBrk="0" hangingPunct="1">
+        <a:defRPr sz="2700" kern="1200">
           <a:solidFill>
             <a:schemeClr val="tx1"/>
           </a:solidFill>
@@ -3018,8 +3018,8 @@
           <a:cs typeface="+mn-cs"/>
         </a:defRPr>
       </a:lvl3pPr>
-      <a:lvl4pPr marL="3086100" algn="l" defTabSz="2057400" rtl="0" eaLnBrk="1" latinLnBrk="0" hangingPunct="1">
-        <a:defRPr sz="4100" kern="1200">
+      <a:lvl4pPr marL="2005965" algn="l" defTabSz="1337310" rtl="0" eaLnBrk="1" latinLnBrk="0" hangingPunct="1">
+        <a:defRPr sz="2700" kern="1200">
           <a:solidFill>
             <a:schemeClr val="tx1"/>
           </a:solidFill>
@@ -3028,8 +3028,8 @@
           <a:cs typeface="+mn-cs"/>
         </a:defRPr>
       </a:lvl4pPr>
-      <a:lvl5pPr marL="4114800" algn="l" defTabSz="2057400" rtl="0" eaLnBrk="1" latinLnBrk="0" hangingPunct="1">
-        <a:defRPr sz="4100" kern="1200">
+      <a:lvl5pPr marL="2674620" algn="l" defTabSz="1337310" rtl="0" eaLnBrk="1" latinLnBrk="0" hangingPunct="1">
+        <a:defRPr sz="2700" kern="1200">
           <a:solidFill>
             <a:schemeClr val="tx1"/>
           </a:solidFill>
@@ -3038,8 +3038,8 @@
           <a:cs typeface="+mn-cs"/>
         </a:defRPr>
       </a:lvl5pPr>
-      <a:lvl6pPr marL="5143500" algn="l" defTabSz="2057400" rtl="0" eaLnBrk="1" latinLnBrk="0" hangingPunct="1">
-        <a:defRPr sz="4100" kern="1200">
+      <a:lvl6pPr marL="3343275" algn="l" defTabSz="1337310" rtl="0" eaLnBrk="1" latinLnBrk="0" hangingPunct="1">
+        <a:defRPr sz="2700" kern="1200">
           <a:solidFill>
             <a:schemeClr val="tx1"/>
           </a:solidFill>
@@ -3048,8 +3048,8 @@
           <a:cs typeface="+mn-cs"/>
         </a:defRPr>
       </a:lvl6pPr>
-      <a:lvl7pPr marL="6172200" algn="l" defTabSz="2057400" rtl="0" eaLnBrk="1" latinLnBrk="0" hangingPunct="1">
-        <a:defRPr sz="4100" kern="1200">
+      <a:lvl7pPr marL="4011930" algn="l" defTabSz="1337310" rtl="0" eaLnBrk="1" latinLnBrk="0" hangingPunct="1">
+        <a:defRPr sz="2700" kern="1200">
           <a:solidFill>
             <a:schemeClr val="tx1"/>
           </a:solidFill>
@@ -3058,8 +3058,8 @@
           <a:cs typeface="+mn-cs"/>
         </a:defRPr>
       </a:lvl7pPr>
-      <a:lvl8pPr marL="7200900" algn="l" defTabSz="2057400" rtl="0" eaLnBrk="1" latinLnBrk="0" hangingPunct="1">
-        <a:defRPr sz="4100" kern="1200">
+      <a:lvl8pPr marL="4680585" algn="l" defTabSz="1337310" rtl="0" eaLnBrk="1" latinLnBrk="0" hangingPunct="1">
+        <a:defRPr sz="2700" kern="1200">
           <a:solidFill>
             <a:schemeClr val="tx1"/>
           </a:solidFill>
@@ -3068,8 +3068,8 @@
           <a:cs typeface="+mn-cs"/>
         </a:defRPr>
       </a:lvl8pPr>
-      <a:lvl9pPr marL="8229600" algn="l" defTabSz="2057400" rtl="0" eaLnBrk="1" latinLnBrk="0" hangingPunct="1">
-        <a:defRPr sz="4100" kern="1200">
+      <a:lvl9pPr marL="5349240" algn="l" defTabSz="1337310" rtl="0" eaLnBrk="1" latinLnBrk="0" hangingPunct="1">
+        <a:defRPr sz="2700" kern="1200">
           <a:solidFill>
             <a:schemeClr val="tx1"/>
           </a:solidFill>
@@ -3102,7 +3102,7 @@
       </p:grpSpPr>
       <p:pic>
         <p:nvPicPr>
-          <p:cNvPr id="40" name="Picture 2" descr="E:\GitHub\IPAC2014\MKIImpedancePoster\figures\screenDesignCrossSection.png"/>
+          <p:cNvPr id="86" name="Picture 2" descr="E:\GitHub\IPAC2014\MKIImpedancePoster\figures\screenDesignCrossSection.png"/>
           <p:cNvPicPr>
             <a:picLocks noChangeAspect="1" noChangeArrowheads="1"/>
           </p:cNvPicPr>
@@ -3121,7 +3121,7 @@
         </p:blipFill>
         <p:spPr bwMode="auto">
           <a:xfrm>
-            <a:off x="7196899" y="5115678"/>
+            <a:off x="3233050" y="5469797"/>
             <a:ext cx="8132048" cy="3500924"/>
           </a:xfrm>
           <a:prstGeom prst="rect">
@@ -3141,13 +3141,13 @@
       </p:pic>
       <p:cxnSp>
         <p:nvCxnSpPr>
-          <p:cNvPr id="41" name="Straight Connector 40"/>
+          <p:cNvPr id="87" name="Straight Connector 86"/>
           <p:cNvCxnSpPr/>
           <p:nvPr/>
         </p:nvCxnSpPr>
         <p:spPr>
           <a:xfrm>
-            <a:off x="13308774" y="2626100"/>
+            <a:off x="10679852" y="2602817"/>
             <a:ext cx="0" cy="811599"/>
           </a:xfrm>
           <a:prstGeom prst="line">
@@ -3176,7 +3176,7 @@
       </p:cxnSp>
       <p:pic>
         <p:nvPicPr>
-          <p:cNvPr id="42" name="Picture 4"/>
+          <p:cNvPr id="88" name="Picture 4"/>
           <p:cNvPicPr>
             <a:picLocks noChangeAspect="1" noChangeArrowheads="1"/>
           </p:cNvPicPr>
@@ -3197,7 +3197,7 @@
         </p:blipFill>
         <p:spPr bwMode="auto">
           <a:xfrm>
-            <a:off x="4100555" y="1164305"/>
+            <a:off x="1471633" y="1141022"/>
             <a:ext cx="10585251" cy="2198291"/>
           </a:xfrm>
           <a:prstGeom prst="rect">
@@ -3240,13 +3240,13 @@
       </p:pic>
       <p:sp>
         <p:nvSpPr>
-          <p:cNvPr id="43" name="Rectangle 42"/>
+          <p:cNvPr id="89" name="Rectangle 88"/>
           <p:cNvSpPr/>
           <p:nvPr/>
         </p:nvSpPr>
         <p:spPr>
           <a:xfrm>
-            <a:off x="13461595" y="2172417"/>
+            <a:off x="10832673" y="2149134"/>
             <a:ext cx="468100" cy="445791"/>
           </a:xfrm>
           <a:prstGeom prst="rect">
@@ -3286,14 +3286,14 @@
       </p:sp>
       <p:sp>
         <p:nvSpPr>
-          <p:cNvPr id="44" name="TextBox 43"/>
+          <p:cNvPr id="90" name="TextBox 89"/>
           <p:cNvSpPr txBox="1"/>
           <p:nvPr/>
         </p:nvSpPr>
         <p:spPr>
           <a:xfrm>
-            <a:off x="3303611" y="1380329"/>
-            <a:ext cx="1949072" cy="1015663"/>
+            <a:off x="6716" y="1471806"/>
+            <a:ext cx="1865592" cy="1200329"/>
           </a:xfrm>
           <a:prstGeom prst="rect">
             <a:avLst/>
@@ -3309,22 +3309,22 @@
           <a:lstStyle/>
           <a:p>
             <a:r>
-              <a:rPr lang="en-GB" dirty="0" smtClean="0"/>
+              <a:rPr lang="en-GB" sz="3600" dirty="0" smtClean="0"/>
               <a:t>Damping ferrites</a:t>
             </a:r>
-            <a:endParaRPr lang="en-GB" dirty="0"/>
-          </a:p>
-        </p:txBody>
-      </p:sp>
-      <p:sp>
-        <p:nvSpPr>
-          <p:cNvPr id="45" name="Oval 44"/>
+            <a:endParaRPr lang="en-GB" sz="3600" dirty="0"/>
+          </a:p>
+        </p:txBody>
+      </p:sp>
+      <p:sp>
+        <p:nvSpPr>
+          <p:cNvPr id="91" name="Oval 90"/>
           <p:cNvSpPr/>
           <p:nvPr/>
         </p:nvSpPr>
         <p:spPr>
           <a:xfrm>
-            <a:off x="4748627" y="2172417"/>
+            <a:off x="2119705" y="2149134"/>
             <a:ext cx="648072" cy="504056"/>
           </a:xfrm>
           <a:prstGeom prst="ellipse">
@@ -3364,16 +3364,17 @@
       </p:sp>
       <p:cxnSp>
         <p:nvCxnSpPr>
-          <p:cNvPr id="46" name="Straight Arrow Connector 45"/>
+          <p:cNvPr id="92" name="Straight Arrow Connector 91"/>
           <p:cNvCxnSpPr>
-            <a:endCxn id="45" idx="1"/>
+            <a:stCxn id="90" idx="3"/>
+            <a:endCxn id="91" idx="1"/>
           </p:cNvCxnSpPr>
           <p:nvPr/>
         </p:nvCxnSpPr>
         <p:spPr>
           <a:xfrm>
-            <a:off x="4676619" y="2026660"/>
-            <a:ext cx="166916" cy="219574"/>
+            <a:off x="1872308" y="2071971"/>
+            <a:ext cx="342305" cy="150980"/>
           </a:xfrm>
           <a:prstGeom prst="straightConnector1">
             <a:avLst/>
@@ -3402,17 +3403,17 @@
       </p:cxnSp>
       <p:cxnSp>
         <p:nvCxnSpPr>
-          <p:cNvPr id="47" name="Straight Arrow Connector 46"/>
+          <p:cNvPr id="93" name="Straight Arrow Connector 92"/>
           <p:cNvCxnSpPr>
-            <a:stCxn id="64" idx="0"/>
-            <a:endCxn id="43" idx="2"/>
+            <a:stCxn id="110" idx="0"/>
+            <a:endCxn id="89" idx="2"/>
           </p:cNvCxnSpPr>
           <p:nvPr/>
         </p:nvCxnSpPr>
         <p:spPr>
-          <a:xfrm flipV="1">
-            <a:off x="13308774" y="2618208"/>
-            <a:ext cx="386871" cy="748832"/>
+          <a:xfrm flipH="1" flipV="1">
+            <a:off x="11066723" y="2594925"/>
+            <a:ext cx="1240319" cy="1126333"/>
           </a:xfrm>
           <a:prstGeom prst="straightConnector1">
             <a:avLst/>
@@ -3441,14 +3442,14 @@
       </p:cxnSp>
       <p:sp>
         <p:nvSpPr>
-          <p:cNvPr id="48" name="TextBox 47"/>
+          <p:cNvPr id="94" name="TextBox 93"/>
           <p:cNvSpPr txBox="1"/>
           <p:nvPr/>
         </p:nvSpPr>
         <p:spPr>
           <a:xfrm>
-            <a:off x="6332803" y="3297277"/>
-            <a:ext cx="1728192" cy="1015663"/>
+            <a:off x="3844633" y="3255677"/>
+            <a:ext cx="1584996" cy="1200329"/>
           </a:xfrm>
           <a:prstGeom prst="rect">
             <a:avLst/>
@@ -3464,22 +3465,22 @@
           <a:lstStyle/>
           <a:p>
             <a:r>
-              <a:rPr lang="en-GB" dirty="0" smtClean="0"/>
+              <a:rPr lang="en-GB" sz="3600" dirty="0" smtClean="0"/>
               <a:t>Ferrite yoke</a:t>
             </a:r>
-            <a:endParaRPr lang="en-GB" dirty="0"/>
+            <a:endParaRPr lang="en-GB" sz="3600" dirty="0"/>
           </a:p>
         </p:txBody>
       </p:sp>
       <p:cxnSp>
         <p:nvCxnSpPr>
-          <p:cNvPr id="49" name="Straight Arrow Connector 48"/>
+          <p:cNvPr id="95" name="Straight Arrow Connector 94"/>
           <p:cNvCxnSpPr/>
           <p:nvPr/>
         </p:nvCxnSpPr>
         <p:spPr>
           <a:xfrm flipV="1">
-            <a:off x="7484931" y="2618209"/>
+            <a:off x="4856009" y="2594926"/>
             <a:ext cx="513306" cy="650374"/>
           </a:xfrm>
           <a:prstGeom prst="straightConnector1">
@@ -3509,14 +3510,14 @@
       </p:cxnSp>
       <p:sp>
         <p:nvSpPr>
-          <p:cNvPr id="50" name="TextBox 49"/>
+          <p:cNvPr id="96" name="TextBox 95"/>
           <p:cNvSpPr txBox="1"/>
           <p:nvPr/>
         </p:nvSpPr>
         <p:spPr>
           <a:xfrm>
-            <a:off x="5459902" y="473433"/>
-            <a:ext cx="2025029" cy="1015663"/>
+            <a:off x="2210029" y="53661"/>
+            <a:ext cx="2038543" cy="1200329"/>
           </a:xfrm>
           <a:prstGeom prst="rect">
             <a:avLst/>
@@ -3532,23 +3533,23 @@
           <a:lstStyle/>
           <a:p>
             <a:r>
-              <a:rPr lang="en-GB" dirty="0" smtClean="0"/>
+              <a:rPr lang="en-GB" sz="3600" dirty="0" smtClean="0"/>
               <a:t>Ceramic capacitor</a:t>
             </a:r>
-            <a:endParaRPr lang="en-GB" dirty="0"/>
-          </a:p>
-        </p:txBody>
-      </p:sp>
-      <p:sp>
-        <p:nvSpPr>
-          <p:cNvPr id="51" name="TextBox 50"/>
+            <a:endParaRPr lang="en-GB" sz="3600" dirty="0"/>
+          </a:p>
+        </p:txBody>
+      </p:sp>
+      <p:sp>
+        <p:nvSpPr>
+          <p:cNvPr id="97" name="TextBox 96"/>
           <p:cNvSpPr txBox="1"/>
           <p:nvPr/>
         </p:nvSpPr>
         <p:spPr>
           <a:xfrm>
-            <a:off x="7403978" y="610307"/>
-            <a:ext cx="3845597" cy="553998"/>
+            <a:off x="4775057" y="-23281"/>
+            <a:ext cx="3096484" cy="1200329"/>
           </a:xfrm>
           <a:prstGeom prst="rect">
             <a:avLst/>
@@ -3564,23 +3565,23 @@
           <a:lstStyle/>
           <a:p>
             <a:r>
-              <a:rPr lang="en-GB" dirty="0" smtClean="0"/>
+              <a:rPr lang="en-GB" sz="3600" dirty="0" smtClean="0"/>
               <a:t>High voltage (HV) plate</a:t>
             </a:r>
-            <a:endParaRPr lang="en-GB" dirty="0"/>
-          </a:p>
-        </p:txBody>
-      </p:sp>
-      <p:sp>
-        <p:nvSpPr>
-          <p:cNvPr id="52" name="TextBox 51"/>
+            <a:endParaRPr lang="en-GB" sz="3600" dirty="0"/>
+          </a:p>
+        </p:txBody>
+      </p:sp>
+      <p:sp>
+        <p:nvSpPr>
+          <p:cNvPr id="98" name="TextBox 97"/>
           <p:cNvSpPr txBox="1"/>
           <p:nvPr/>
         </p:nvSpPr>
         <p:spPr>
           <a:xfrm>
-            <a:off x="11270829" y="826331"/>
-            <a:ext cx="2400478" cy="553998"/>
+            <a:off x="8462999" y="330659"/>
+            <a:ext cx="2733165" cy="646331"/>
           </a:xfrm>
           <a:prstGeom prst="rect">
             <a:avLst/>
@@ -3596,23 +3597,25 @@
           <a:lstStyle/>
           <a:p>
             <a:r>
-              <a:rPr lang="en-GB" dirty="0" smtClean="0"/>
+              <a:rPr lang="en-GB" sz="3600" dirty="0" smtClean="0"/>
               <a:t>Ground plate</a:t>
             </a:r>
-            <a:endParaRPr lang="en-GB" dirty="0"/>
+            <a:endParaRPr lang="en-GB" sz="3600" dirty="0"/>
           </a:p>
         </p:txBody>
       </p:sp>
       <p:cxnSp>
         <p:nvCxnSpPr>
-          <p:cNvPr id="53" name="Straight Arrow Connector 52"/>
-          <p:cNvCxnSpPr/>
+          <p:cNvPr id="99" name="Straight Arrow Connector 98"/>
+          <p:cNvCxnSpPr>
+            <a:stCxn id="96" idx="2"/>
+          </p:cNvCxnSpPr>
           <p:nvPr/>
         </p:nvCxnSpPr>
         <p:spPr>
-          <a:xfrm flipH="1">
-            <a:off x="6188787" y="1450596"/>
-            <a:ext cx="144016" cy="252898"/>
+          <a:xfrm>
+            <a:off x="3229301" y="1253990"/>
+            <a:ext cx="330564" cy="426221"/>
           </a:xfrm>
           <a:prstGeom prst="straightConnector1">
             <a:avLst/>
@@ -3641,14 +3644,16 @@
       </p:cxnSp>
       <p:cxnSp>
         <p:nvCxnSpPr>
-          <p:cNvPr id="54" name="Straight Arrow Connector 53"/>
-          <p:cNvCxnSpPr/>
+          <p:cNvPr id="100" name="Straight Arrow Connector 99"/>
+          <p:cNvCxnSpPr>
+            <a:stCxn id="96" idx="2"/>
+          </p:cNvCxnSpPr>
           <p:nvPr/>
         </p:nvCxnSpPr>
         <p:spPr>
-          <a:xfrm flipH="1">
-            <a:off x="7088887" y="1450596"/>
-            <a:ext cx="72008" cy="252898"/>
+          <a:xfrm>
+            <a:off x="3229301" y="1253990"/>
+            <a:ext cx="1230664" cy="426221"/>
           </a:xfrm>
           <a:prstGeom prst="straightConnector1">
             <a:avLst/>
@@ -3677,13 +3682,13 @@
       </p:cxnSp>
       <p:cxnSp>
         <p:nvCxnSpPr>
-          <p:cNvPr id="55" name="Straight Arrow Connector 54"/>
+          <p:cNvPr id="101" name="Straight Arrow Connector 100"/>
           <p:cNvCxnSpPr/>
           <p:nvPr/>
         </p:nvCxnSpPr>
         <p:spPr>
           <a:xfrm>
-            <a:off x="8452635" y="1164305"/>
+            <a:off x="5823713" y="1141022"/>
             <a:ext cx="103611" cy="539189"/>
           </a:xfrm>
           <a:prstGeom prst="straightConnector1">
@@ -3713,14 +3718,16 @@
       </p:cxnSp>
       <p:cxnSp>
         <p:nvCxnSpPr>
-          <p:cNvPr id="56" name="Straight Arrow Connector 55"/>
-          <p:cNvCxnSpPr/>
+          <p:cNvPr id="102" name="Straight Arrow Connector 101"/>
+          <p:cNvCxnSpPr>
+            <a:stCxn id="97" idx="2"/>
+          </p:cNvCxnSpPr>
           <p:nvPr/>
         </p:nvCxnSpPr>
         <p:spPr>
           <a:xfrm flipH="1">
-            <a:off x="8772271" y="1103330"/>
-            <a:ext cx="274203" cy="552932"/>
+            <a:off x="6143350" y="1177048"/>
+            <a:ext cx="179949" cy="455931"/>
           </a:xfrm>
           <a:prstGeom prst="straightConnector1">
             <a:avLst/>
@@ -3749,14 +3756,14 @@
       </p:cxnSp>
       <p:cxnSp>
         <p:nvCxnSpPr>
-          <p:cNvPr id="57" name="Straight Arrow Connector 56"/>
+          <p:cNvPr id="103" name="Straight Arrow Connector 102"/>
           <p:cNvCxnSpPr/>
           <p:nvPr/>
         </p:nvCxnSpPr>
         <p:spPr>
           <a:xfrm flipH="1">
-            <a:off x="10500463" y="1287746"/>
-            <a:ext cx="770366" cy="368516"/>
+            <a:off x="7871542" y="976990"/>
+            <a:ext cx="952072" cy="655989"/>
           </a:xfrm>
           <a:prstGeom prst="straightConnector1">
             <a:avLst/>
@@ -3785,14 +3792,14 @@
       </p:cxnSp>
       <p:cxnSp>
         <p:nvCxnSpPr>
-          <p:cNvPr id="58" name="Straight Arrow Connector 57"/>
+          <p:cNvPr id="104" name="Straight Arrow Connector 103"/>
           <p:cNvCxnSpPr/>
           <p:nvPr/>
         </p:nvCxnSpPr>
         <p:spPr>
           <a:xfrm flipH="1">
-            <a:off x="10932511" y="1380329"/>
-            <a:ext cx="796036" cy="275933"/>
+            <a:off x="8303589" y="1044178"/>
+            <a:ext cx="1057551" cy="588801"/>
           </a:xfrm>
           <a:prstGeom prst="straightConnector1">
             <a:avLst/>
@@ -3821,13 +3828,13 @@
       </p:cxnSp>
       <p:cxnSp>
         <p:nvCxnSpPr>
-          <p:cNvPr id="59" name="Straight Arrow Connector 58"/>
+          <p:cNvPr id="105" name="Straight Arrow Connector 104"/>
           <p:cNvCxnSpPr/>
           <p:nvPr/>
         </p:nvCxnSpPr>
         <p:spPr>
           <a:xfrm flipH="1">
-            <a:off x="4235766" y="2408959"/>
+            <a:off x="1606844" y="2385676"/>
             <a:ext cx="10369152" cy="0"/>
           </a:xfrm>
           <a:prstGeom prst="straightConnector1">
@@ -3857,14 +3864,14 @@
       </p:cxnSp>
       <p:sp>
         <p:nvSpPr>
-          <p:cNvPr id="60" name="TextBox 59"/>
+          <p:cNvPr id="106" name="TextBox 105"/>
           <p:cNvSpPr txBox="1"/>
           <p:nvPr/>
         </p:nvSpPr>
         <p:spPr>
           <a:xfrm>
-            <a:off x="13949525" y="1888160"/>
-            <a:ext cx="1379422" cy="553998"/>
+            <a:off x="11797949" y="1864877"/>
+            <a:ext cx="2540432" cy="646331"/>
           </a:xfrm>
           <a:prstGeom prst="rect">
             <a:avLst/>
@@ -3880,22 +3887,22 @@
           <a:lstStyle/>
           <a:p>
             <a:r>
-              <a:rPr lang="en-GB" dirty="0" smtClean="0"/>
+              <a:rPr lang="en-GB" sz="3600" dirty="0" smtClean="0"/>
               <a:t>Beam</a:t>
             </a:r>
-            <a:endParaRPr lang="en-GB" dirty="0"/>
+            <a:endParaRPr lang="en-GB" sz="3600" dirty="0"/>
           </a:p>
         </p:txBody>
       </p:sp>
       <p:cxnSp>
         <p:nvCxnSpPr>
-          <p:cNvPr id="61" name="Straight Arrow Connector 60"/>
+          <p:cNvPr id="107" name="Straight Arrow Connector 106"/>
           <p:cNvCxnSpPr/>
           <p:nvPr/>
         </p:nvCxnSpPr>
         <p:spPr>
           <a:xfrm flipH="1" flipV="1">
-            <a:off x="13764178" y="2493554"/>
+            <a:off x="11135256" y="2470271"/>
             <a:ext cx="62181" cy="297802"/>
           </a:xfrm>
           <a:prstGeom prst="straightConnector1">
@@ -3925,13 +3932,13 @@
       </p:cxnSp>
       <p:cxnSp>
         <p:nvCxnSpPr>
-          <p:cNvPr id="62" name="Straight Connector 61"/>
+          <p:cNvPr id="108" name="Straight Connector 107"/>
           <p:cNvCxnSpPr/>
           <p:nvPr/>
         </p:nvCxnSpPr>
         <p:spPr>
           <a:xfrm>
-            <a:off x="5531909" y="2618208"/>
+            <a:off x="2902987" y="2594925"/>
             <a:ext cx="0" cy="811599"/>
           </a:xfrm>
           <a:prstGeom prst="line">
@@ -3960,13 +3967,13 @@
       </p:cxnSp>
       <p:cxnSp>
         <p:nvCxnSpPr>
-          <p:cNvPr id="63" name="Straight Connector 62"/>
+          <p:cNvPr id="109" name="Straight Connector 108"/>
           <p:cNvCxnSpPr/>
           <p:nvPr/>
         </p:nvCxnSpPr>
         <p:spPr>
           <a:xfrm>
-            <a:off x="13308774" y="2629078"/>
+            <a:off x="10679852" y="2605795"/>
             <a:ext cx="0" cy="811599"/>
           </a:xfrm>
           <a:prstGeom prst="line">
@@ -3995,14 +4002,14 @@
       </p:cxnSp>
       <p:sp>
         <p:nvSpPr>
-          <p:cNvPr id="64" name="TextBox 63"/>
+          <p:cNvPr id="110" name="TextBox 109"/>
           <p:cNvSpPr txBox="1"/>
           <p:nvPr/>
         </p:nvSpPr>
         <p:spPr>
           <a:xfrm>
-            <a:off x="12190675" y="3367040"/>
-            <a:ext cx="2236197" cy="1021373"/>
+            <a:off x="10825056" y="3721258"/>
+            <a:ext cx="2963971" cy="1200329"/>
           </a:xfrm>
           <a:prstGeom prst="rect">
             <a:avLst/>
@@ -4018,26 +4025,26 @@
           <a:lstStyle/>
           <a:p>
             <a:r>
-              <a:rPr lang="en-GB" dirty="0" err="1" smtClean="0"/>
+              <a:rPr lang="en-GB" sz="3600" dirty="0" err="1" smtClean="0"/>
               <a:t>Capacitively</a:t>
             </a:r>
             <a:r>
-              <a:rPr lang="en-GB" dirty="0" smtClean="0"/>
+              <a:rPr lang="en-GB" sz="3600" dirty="0" smtClean="0"/>
               <a:t> coupled end</a:t>
             </a:r>
-            <a:endParaRPr lang="en-GB" dirty="0"/>
+            <a:endParaRPr lang="en-GB" sz="3600" dirty="0"/>
           </a:p>
         </p:txBody>
       </p:sp>
       <p:cxnSp>
         <p:nvCxnSpPr>
-          <p:cNvPr id="65" name="Straight Arrow Connector 64"/>
+          <p:cNvPr id="111" name="Straight Arrow Connector 110"/>
           <p:cNvCxnSpPr/>
           <p:nvPr/>
         </p:nvCxnSpPr>
         <p:spPr>
           <a:xfrm>
-            <a:off x="5531909" y="3240106"/>
+            <a:off x="2902987" y="3216823"/>
             <a:ext cx="7776865" cy="0"/>
           </a:xfrm>
           <a:prstGeom prst="straightConnector1">
@@ -4068,14 +4075,14 @@
       </p:cxnSp>
       <p:sp>
         <p:nvSpPr>
-          <p:cNvPr id="66" name="TextBox 65"/>
+          <p:cNvPr id="112" name="TextBox 111"/>
           <p:cNvSpPr txBox="1"/>
           <p:nvPr/>
         </p:nvSpPr>
         <p:spPr>
           <a:xfrm>
-            <a:off x="8452635" y="2791356"/>
-            <a:ext cx="1187679" cy="553998"/>
+            <a:off x="5823713" y="2768073"/>
+            <a:ext cx="1475361" cy="646331"/>
           </a:xfrm>
           <a:prstGeom prst="rect">
             <a:avLst/>
@@ -4091,23 +4098,23 @@
           <a:lstStyle/>
           <a:p>
             <a:r>
-              <a:rPr lang="en-GB" dirty="0" smtClean="0"/>
+              <a:rPr lang="en-GB" sz="3600" dirty="0" smtClean="0"/>
               <a:t>2.7m</a:t>
             </a:r>
-            <a:endParaRPr lang="en-GB" dirty="0"/>
+            <a:endParaRPr lang="en-GB" sz="3600" dirty="0"/>
           </a:p>
         </p:txBody>
       </p:sp>
       <p:cxnSp>
         <p:nvCxnSpPr>
-          <p:cNvPr id="67" name="Straight Connector 66"/>
+          <p:cNvPr id="113" name="Straight Connector 112"/>
           <p:cNvCxnSpPr/>
           <p:nvPr/>
         </p:nvCxnSpPr>
         <p:spPr>
           <a:xfrm flipH="1">
-            <a:off x="7354551" y="2246234"/>
-            <a:ext cx="6147658" cy="2923508"/>
+            <a:off x="3233050" y="2222951"/>
+            <a:ext cx="7640237" cy="3374885"/>
           </a:xfrm>
           <a:prstGeom prst="line">
             <a:avLst/>
@@ -4135,14 +4142,14 @@
       </p:cxnSp>
       <p:cxnSp>
         <p:nvCxnSpPr>
-          <p:cNvPr id="68" name="Straight Connector 67"/>
+          <p:cNvPr id="114" name="Straight Connector 113"/>
           <p:cNvCxnSpPr/>
           <p:nvPr/>
         </p:nvCxnSpPr>
         <p:spPr>
-          <a:xfrm>
-            <a:off x="13929696" y="2206278"/>
-            <a:ext cx="1399250" cy="2909401"/>
+          <a:xfrm flipH="1">
+            <a:off x="9900595" y="2182995"/>
+            <a:ext cx="1400179" cy="3122439"/>
           </a:xfrm>
           <a:prstGeom prst="line">
             <a:avLst/>
@@ -4170,13 +4177,13 @@
       </p:cxnSp>
       <p:cxnSp>
         <p:nvCxnSpPr>
-          <p:cNvPr id="69" name="Straight Connector 68"/>
+          <p:cNvPr id="115" name="Straight Connector 114"/>
           <p:cNvCxnSpPr/>
           <p:nvPr/>
         </p:nvCxnSpPr>
         <p:spPr>
           <a:xfrm>
-            <a:off x="7808735" y="6031689"/>
+            <a:off x="3843494" y="6008405"/>
             <a:ext cx="0" cy="2584913"/>
           </a:xfrm>
           <a:prstGeom prst="line">
@@ -4205,13 +4212,13 @@
       </p:cxnSp>
       <p:cxnSp>
         <p:nvCxnSpPr>
-          <p:cNvPr id="70" name="Straight Connector 69"/>
+          <p:cNvPr id="116" name="Straight Connector 115"/>
           <p:cNvCxnSpPr/>
           <p:nvPr/>
         </p:nvCxnSpPr>
         <p:spPr>
           <a:xfrm>
-            <a:off x="11332693" y="6031690"/>
+            <a:off x="7452323" y="6008407"/>
             <a:ext cx="0" cy="2584913"/>
           </a:xfrm>
           <a:prstGeom prst="line">
@@ -4240,14 +4247,14 @@
       </p:cxnSp>
       <p:sp>
         <p:nvSpPr>
-          <p:cNvPr id="71" name="TextBox 70"/>
+          <p:cNvPr id="117" name="TextBox 116"/>
           <p:cNvSpPr txBox="1"/>
           <p:nvPr/>
         </p:nvSpPr>
         <p:spPr>
           <a:xfrm>
-            <a:off x="9046474" y="8106380"/>
-            <a:ext cx="1128386" cy="553998"/>
+            <a:off x="5220713" y="8165704"/>
+            <a:ext cx="1413221" cy="646331"/>
           </a:xfrm>
           <a:prstGeom prst="rect">
             <a:avLst/>
@@ -4255,38 +4262,38 @@
           <a:noFill/>
         </p:spPr>
         <p:txBody>
-          <a:bodyPr wrap="none" rtlCol="0">
+          <a:bodyPr wrap="square" rtlCol="0">
             <a:spAutoFit/>
           </a:bodyPr>
           <a:lstStyle/>
           <a:p>
             <a:r>
-              <a:rPr lang="fr-CA" dirty="0" err="1" smtClean="0"/>
+              <a:rPr lang="fr-CA" sz="3600" dirty="0" err="1" smtClean="0"/>
               <a:t>L</a:t>
             </a:r>
             <a:r>
-              <a:rPr lang="fr-CA" baseline="-25000" dirty="0" err="1" smtClean="0"/>
+              <a:rPr lang="fr-CA" sz="3600" baseline="-25000" dirty="0" err="1" smtClean="0"/>
               <a:t>overlap</a:t>
             </a:r>
-            <a:endParaRPr lang="en-GB" baseline="-25000" dirty="0"/>
+            <a:endParaRPr lang="en-GB" sz="3600" baseline="-25000" dirty="0"/>
           </a:p>
         </p:txBody>
       </p:sp>
       <p:cxnSp>
         <p:nvCxnSpPr>
-          <p:cNvPr id="72" name="Straight Arrow Connector 71"/>
+          <p:cNvPr id="118" name="Straight Arrow Connector 117"/>
           <p:cNvCxnSpPr/>
           <p:nvPr/>
         </p:nvCxnSpPr>
         <p:spPr>
           <a:xfrm>
-            <a:off x="7808735" y="8106380"/>
-            <a:ext cx="3506257" cy="0"/>
+            <a:off x="3843494" y="8160041"/>
+            <a:ext cx="3608829" cy="0"/>
           </a:xfrm>
           <a:prstGeom prst="straightConnector1">
             <a:avLst/>
           </a:prstGeom>
-          <a:ln w="31750">
+          <a:ln w="38100">
             <a:solidFill>
               <a:schemeClr val="tx1"/>
             </a:solidFill>
@@ -4311,14 +4318,14 @@
       </p:cxnSp>
       <p:sp>
         <p:nvSpPr>
-          <p:cNvPr id="73" name="TextBox 72"/>
+          <p:cNvPr id="119" name="TextBox 118"/>
           <p:cNvSpPr txBox="1"/>
           <p:nvPr/>
         </p:nvSpPr>
         <p:spPr>
           <a:xfrm>
-            <a:off x="12190675" y="4554361"/>
-            <a:ext cx="3534404" cy="1477328"/>
+            <a:off x="8744649" y="5483339"/>
+            <a:ext cx="5657151" cy="1200329"/>
           </a:xfrm>
           <a:prstGeom prst="rect">
             <a:avLst/>
@@ -4334,55 +4341,55 @@
           <a:lstStyle/>
           <a:p>
             <a:r>
-              <a:rPr lang="fr-CA" dirty="0" smtClean="0"/>
+              <a:rPr lang="fr-CA" sz="3600" dirty="0" smtClean="0"/>
               <a:t>1mm gap </a:t>
             </a:r>
             <a:r>
-              <a:rPr lang="fr-CA" dirty="0" err="1" smtClean="0"/>
+              <a:rPr lang="fr-CA" sz="3600" dirty="0" err="1" smtClean="0"/>
               <a:t>between</a:t>
             </a:r>
             <a:r>
-              <a:rPr lang="fr-CA" dirty="0" smtClean="0"/>
+              <a:rPr lang="fr-CA" sz="3600" dirty="0" smtClean="0"/>
               <a:t> </a:t>
             </a:r>
             <a:r>
-              <a:rPr lang="fr-CA" dirty="0" err="1" smtClean="0"/>
+              <a:rPr lang="fr-CA" sz="3600" dirty="0" err="1" smtClean="0"/>
               <a:t>ceramic</a:t>
             </a:r>
             <a:r>
-              <a:rPr lang="fr-CA" dirty="0"/>
+              <a:rPr lang="fr-CA" sz="3600" dirty="0"/>
               <a:t> </a:t>
             </a:r>
             <a:r>
-              <a:rPr lang="fr-CA" dirty="0" smtClean="0"/>
+              <a:rPr lang="fr-CA" sz="3600" dirty="0" smtClean="0"/>
               <a:t>tube and </a:t>
             </a:r>
             <a:r>
-              <a:rPr lang="fr-CA" dirty="0" err="1" smtClean="0"/>
+              <a:rPr lang="fr-CA" sz="3600" dirty="0" err="1" smtClean="0"/>
               <a:t>conducting</a:t>
             </a:r>
             <a:r>
-              <a:rPr lang="fr-CA" dirty="0" smtClean="0"/>
+              <a:rPr lang="fr-CA" sz="3600" dirty="0" smtClean="0"/>
               <a:t> </a:t>
             </a:r>
             <a:r>
-              <a:rPr lang="fr-CA" dirty="0" err="1" smtClean="0"/>
+              <a:rPr lang="fr-CA" sz="3600" dirty="0" err="1" smtClean="0"/>
               <a:t>cylinder</a:t>
             </a:r>
-            <a:endParaRPr lang="en-GB" dirty="0"/>
-          </a:p>
-        </p:txBody>
-      </p:sp>
-      <p:sp>
-        <p:nvSpPr>
-          <p:cNvPr id="74" name="TextBox 73"/>
+            <a:endParaRPr lang="en-GB" sz="3600" dirty="0"/>
+          </a:p>
+        </p:txBody>
+      </p:sp>
+      <p:sp>
+        <p:nvSpPr>
+          <p:cNvPr id="120" name="TextBox 119"/>
           <p:cNvSpPr txBox="1"/>
           <p:nvPr/>
         </p:nvSpPr>
         <p:spPr>
           <a:xfrm>
-            <a:off x="13502209" y="6203877"/>
-            <a:ext cx="2191313" cy="1015663"/>
+            <a:off x="9547928" y="6654532"/>
+            <a:ext cx="4500041" cy="646331"/>
           </a:xfrm>
           <a:prstGeom prst="rect">
             <a:avLst/>
@@ -4398,31 +4405,31 @@
           <a:lstStyle/>
           <a:p>
             <a:r>
-              <a:rPr lang="fr-CA" dirty="0" err="1" smtClean="0"/>
+              <a:rPr lang="fr-CA" sz="3600" dirty="0" err="1" smtClean="0"/>
               <a:t>Screen</a:t>
             </a:r>
             <a:r>
-              <a:rPr lang="fr-CA" dirty="0" smtClean="0"/>
+              <a:rPr lang="fr-CA" sz="3600" dirty="0" smtClean="0"/>
               <a:t> </a:t>
             </a:r>
             <a:r>
-              <a:rPr lang="fr-CA" dirty="0" err="1" smtClean="0"/>
+              <a:rPr lang="fr-CA" sz="3600" dirty="0" err="1" smtClean="0"/>
               <a:t>conductors</a:t>
             </a:r>
-            <a:endParaRPr lang="en-GB" dirty="0"/>
-          </a:p>
-        </p:txBody>
-      </p:sp>
-      <p:sp>
-        <p:nvSpPr>
-          <p:cNvPr id="75" name="TextBox 74"/>
+            <a:endParaRPr lang="en-GB" sz="3600" dirty="0"/>
+          </a:p>
+        </p:txBody>
+      </p:sp>
+      <p:sp>
+        <p:nvSpPr>
+          <p:cNvPr id="121" name="TextBox 120"/>
           <p:cNvSpPr txBox="1"/>
           <p:nvPr/>
         </p:nvSpPr>
         <p:spPr>
           <a:xfrm>
-            <a:off x="12262961" y="7644715"/>
-            <a:ext cx="3462118" cy="1477328"/>
+            <a:off x="8713068" y="7812930"/>
+            <a:ext cx="5625313" cy="1200329"/>
           </a:xfrm>
           <a:prstGeom prst="rect">
             <a:avLst/>
@@ -4438,38 +4445,38 @@
           <a:lstStyle/>
           <a:p>
             <a:r>
-              <a:rPr lang="fr-CA" dirty="0" smtClean="0"/>
+              <a:rPr lang="fr-CA" sz="3600" dirty="0" smtClean="0"/>
               <a:t>3mm gap </a:t>
             </a:r>
             <a:r>
-              <a:rPr lang="fr-CA" dirty="0" err="1" smtClean="0"/>
+              <a:rPr lang="fr-CA" sz="3600" dirty="0" err="1" smtClean="0"/>
               <a:t>between</a:t>
             </a:r>
             <a:r>
-              <a:rPr lang="fr-CA" dirty="0" smtClean="0"/>
+              <a:rPr lang="fr-CA" sz="3600" dirty="0" smtClean="0"/>
               <a:t> </a:t>
             </a:r>
             <a:r>
-              <a:rPr lang="fr-CA" dirty="0" err="1" smtClean="0"/>
+              <a:rPr lang="fr-CA" sz="3600" dirty="0" err="1" smtClean="0"/>
               <a:t>ceramic</a:t>
             </a:r>
             <a:r>
-              <a:rPr lang="fr-CA" dirty="0" smtClean="0"/>
+              <a:rPr lang="fr-CA" sz="3600" dirty="0" smtClean="0"/>
               <a:t> tube and </a:t>
             </a:r>
             <a:r>
-              <a:rPr lang="fr-CA" dirty="0" err="1" smtClean="0"/>
+              <a:rPr lang="fr-CA" sz="3600" dirty="0" err="1" smtClean="0"/>
               <a:t>conducting</a:t>
             </a:r>
             <a:r>
-              <a:rPr lang="fr-CA" dirty="0" smtClean="0"/>
+              <a:rPr lang="fr-CA" sz="3600" dirty="0" smtClean="0"/>
               <a:t> </a:t>
             </a:r>
             <a:r>
-              <a:rPr lang="fr-CA" dirty="0" err="1" smtClean="0"/>
+              <a:rPr lang="fr-CA" sz="3600" dirty="0" err="1" smtClean="0"/>
               <a:t>cylinder</a:t>
             </a:r>
-            <a:endParaRPr lang="en-GB" dirty="0"/>
+            <a:endParaRPr lang="en-GB" sz="3600" dirty="0"/>
           </a:p>
         </p:txBody>
       </p:sp>

</xml_diff>